<commit_message>
edit soln CP_random_walk_stationary_distributions; tweak 1/2 dozen slide shows
</commit_message>
<xml_diff>
--- a/spring12/slidesS12/birthday-matching.pptx
+++ b/spring12/slidesS12/birthday-matching.pptx
@@ -3100,37 +3100,7 @@
                 <a:uFillTx/>
                 <a:latin typeface="Comic Sans MS" pitchFamily="66" charset="0"/>
               </a:rPr>
-              <a:t>Albert R Meyer,                May </a:t>
-            </a:r>
-            <a:r>
-              <a:rPr kumimoji="0" lang="en-US" sz="1200" b="0" i="0" u="none" strike="noStrike" kern="1200" cap="none" spc="0" normalizeH="0" baseline="0" noProof="0" dirty="0" smtClean="0">
-                <a:ln>
-                  <a:noFill/>
-                </a:ln>
-                <a:solidFill>
-                  <a:schemeClr val="tx1"/>
-                </a:solidFill>
-                <a:effectLst/>
-                <a:uLnTx/>
-                <a:uFillTx/>
-                <a:latin typeface="Comic Sans MS" pitchFamily="66" charset="0"/>
-              </a:rPr>
-              <a:t>9, </a:t>
-            </a:r>
-            <a:r>
-              <a:rPr kumimoji="0" lang="en-US" sz="1200" b="0" i="0" u="none" strike="noStrike" kern="1200" cap="none" spc="0" normalizeH="0" baseline="0" noProof="0" dirty="0" smtClean="0">
-                <a:ln>
-                  <a:noFill/>
-                </a:ln>
-                <a:solidFill>
-                  <a:schemeClr val="tx1"/>
-                </a:solidFill>
-                <a:effectLst/>
-                <a:uLnTx/>
-                <a:uFillTx/>
-                <a:latin typeface="Comic Sans MS" pitchFamily="66" charset="0"/>
-              </a:rPr>
-              <a:t>2012</a:t>
+              <a:t>Albert R Meyer,                May 9, 2012</a:t>
             </a:r>
             <a:endParaRPr kumimoji="0" lang="en-US" sz="1200" b="0" i="0" u="none" strike="noStrike" kern="1200" cap="none" spc="0" normalizeH="0" baseline="0" noProof="0" dirty="0">
               <a:ln>
@@ -4392,7 +4362,7 @@
           <a:p>
             <a:pPr algn="ctr"/>
             <a:r>
-              <a:rPr lang="en-US" sz="6600" b="1" dirty="0" smtClean="0">
+              <a:rPr lang="en-US" sz="8000" b="1" dirty="0" smtClean="0">
                 <a:solidFill>
                   <a:schemeClr val="tx2"/>
                 </a:solidFill>
@@ -4401,7 +4371,7 @@
               </a:rPr>
               <a:t>Matching Birthdays</a:t>
             </a:r>
-            <a:endParaRPr lang="en-US" sz="1400" b="1" dirty="0">
+            <a:endParaRPr lang="en-US" sz="1800" b="1" dirty="0">
               <a:solidFill>
                 <a:schemeClr val="tx2"/>
               </a:solidFill>
@@ -4496,7 +4466,7 @@
           <a:graphicData uri="http://schemas.openxmlformats.org/presentationml/2006/ole">
             <mc:AlternateContent xmlns:mc="http://schemas.openxmlformats.org/markup-compatibility/2006">
               <mc:Choice xmlns:v="urn:schemas-microsoft-com:vml" Requires="v">
-                <p:oleObj spid="_x0000_s586795" name="Equation" r:id="rId3" imgW="1003300" imgH="457200" progId="Equation.DSMT4">
+                <p:oleObj spid="_x0000_s586798" name="Equation" r:id="rId3" imgW="1003300" imgH="457200" progId="Equation.DSMT4">
                   <p:embed/>
                 </p:oleObj>
               </mc:Choice>
@@ -5967,7 +5937,7 @@
           <a:lstStyle/>
           <a:p>
             <a:r>
-              <a:rPr lang="en-US" b="0"/>
+              <a:rPr lang="en-US" sz="4000" dirty="0"/>
               <a:t>Birthday Pairs</a:t>
             </a:r>
           </a:p>
@@ -6129,7 +6099,7 @@
           <a:graphicData uri="http://schemas.openxmlformats.org/presentationml/2006/ole">
             <mc:AlternateContent xmlns:mc="http://schemas.openxmlformats.org/markup-compatibility/2006">
               <mc:Choice xmlns:v="urn:schemas-microsoft-com:vml" Requires="v">
-                <p:oleObj spid="_x0000_s578609" name="Equation" r:id="rId6" imgW="762000" imgH="381000" progId="Equation.DSMT4">
+                <p:oleObj spid="_x0000_s578612" name="Equation" r:id="rId6" imgW="762000" imgH="381000" progId="Equation.DSMT4">
                   <p:embed/>
                 </p:oleObj>
               </mc:Choice>
@@ -6487,7 +6457,7 @@
                             </p:stCondLst>
                             <p:childTnLst>
                               <p:par>
-                                <p:cTn id="16" presetID="22" presetClass="entr" presetSubtype="8" fill="hold" nodeType="clickEffect">
+                                <p:cTn id="16" presetID="9" presetClass="entr" presetSubtype="0" fill="hold" grpId="0" nodeType="clickEffect">
                                   <p:stCondLst>
                                     <p:cond delay="0"/>
                                   </p:stCondLst>
@@ -6500,7 +6470,7 @@
                                           </p:stCondLst>
                                         </p:cTn>
                                         <p:tgtEl>
-                                          <p:spTgt spid="229383"/>
+                                          <p:spTgt spid="229384"/>
                                         </p:tgtEl>
                                         <p:attrNameLst>
                                           <p:attrName>style.visibility</p:attrName>
@@ -6510,11 +6480,11 @@
                                         <p:strVal val="visible"/>
                                       </p:to>
                                     </p:set>
-                                    <p:animEffect transition="in" filter="wipe(left)">
+                                    <p:animEffect transition="in" filter="dissolve">
                                       <p:cBhvr>
                                         <p:cTn id="18" dur="500"/>
                                         <p:tgtEl>
-                                          <p:spTgt spid="229383"/>
+                                          <p:spTgt spid="229384"/>
                                         </p:tgtEl>
                                       </p:cBhvr>
                                     </p:animEffect>
@@ -6540,7 +6510,7 @@
                             </p:stCondLst>
                             <p:childTnLst>
                               <p:par>
-                                <p:cTn id="21" presetID="9" presetClass="entr" presetSubtype="0" fill="hold" grpId="0" nodeType="clickEffect">
+                                <p:cTn id="21" presetID="22" presetClass="entr" presetSubtype="8" fill="hold" nodeType="clickEffect">
                                   <p:stCondLst>
                                     <p:cond delay="0"/>
                                   </p:stCondLst>
@@ -6553,7 +6523,7 @@
                                           </p:stCondLst>
                                         </p:cTn>
                                         <p:tgtEl>
-                                          <p:spTgt spid="229384"/>
+                                          <p:spTgt spid="229383"/>
                                         </p:tgtEl>
                                         <p:attrNameLst>
                                           <p:attrName>style.visibility</p:attrName>
@@ -6563,11 +6533,11 @@
                                         <p:strVal val="visible"/>
                                       </p:to>
                                     </p:set>
-                                    <p:animEffect transition="in" filter="dissolve">
+                                    <p:animEffect transition="in" filter="wipe(left)">
                                       <p:cBhvr>
                                         <p:cTn id="23" dur="500"/>
                                         <p:tgtEl>
-                                          <p:spTgt spid="229384"/>
+                                          <p:spTgt spid="229383"/>
                                         </p:tgtEl>
                                       </p:cBhvr>
                                     </p:animEffect>
@@ -6628,28 +6598,6 @@
       </p:grpSpPr>
       <p:sp>
         <p:nvSpPr>
-          <p:cNvPr id="230402" name="Rectangle 2"/>
-          <p:cNvSpPr>
-            <a:spLocks noGrp="1" noChangeArrowheads="1"/>
-          </p:cNvSpPr>
-          <p:nvPr>
-            <p:ph type="title"/>
-          </p:nvPr>
-        </p:nvSpPr>
-        <p:spPr/>
-        <p:txBody>
-          <a:bodyPr/>
-          <a:lstStyle/>
-          <a:p>
-            <a:r>
-              <a:rPr lang="en-US" b="0"/>
-              <a:t>Birthday Pairs</a:t>
-            </a:r>
-          </a:p>
-        </p:txBody>
-      </p:sp>
-      <p:sp>
-        <p:nvSpPr>
           <p:cNvPr id="230403" name="Rectangle 3"/>
           <p:cNvSpPr>
             <a:spLocks noGrp="1" noChangeArrowheads="1"/>
@@ -6705,7 +6653,7 @@
           <a:graphicData uri="http://schemas.openxmlformats.org/presentationml/2006/ole">
             <mc:AlternateContent xmlns:mc="http://schemas.openxmlformats.org/markup-compatibility/2006">
               <mc:Choice xmlns:v="urn:schemas-microsoft-com:vml" Requires="v">
-                <p:oleObj spid="_x0000_s580653" name="Equation" r:id="rId5" imgW="1790700" imgH="482600" progId="Equation.DSMT4">
+                <p:oleObj spid="_x0000_s580656" name="Equation" r:id="rId5" imgW="1790700" imgH="482600" progId="Equation.DSMT4">
                   <p:embed/>
                 </p:oleObj>
               </mc:Choice>
@@ -6844,6 +6792,33 @@
                 <a:latin typeface="Comic Sans MS" charset="0"/>
               </a:rPr>
               <a:t>] = 1/d</a:t>
+            </a:r>
+          </a:p>
+        </p:txBody>
+      </p:sp>
+      <p:sp>
+        <p:nvSpPr>
+          <p:cNvPr id="7" name="Rectangle 2"/>
+          <p:cNvSpPr>
+            <a:spLocks noGrp="1" noChangeArrowheads="1"/>
+          </p:cNvSpPr>
+          <p:nvPr>
+            <p:ph type="title"/>
+          </p:nvPr>
+        </p:nvSpPr>
+        <p:spPr>
+          <a:xfrm>
+            <a:off x="1295400" y="228600"/>
+            <a:ext cx="6553200" cy="838200"/>
+          </a:xfrm>
+        </p:spPr>
+        <p:txBody>
+          <a:bodyPr/>
+          <a:lstStyle/>
+          <a:p>
+            <a:r>
+              <a:rPr lang="en-US" sz="4000" dirty="0"/>
+              <a:t>Birthday Pairs</a:t>
             </a:r>
           </a:p>
         </p:txBody>
@@ -12830,7 +12805,7 @@
           <a:graphicData uri="http://schemas.openxmlformats.org/presentationml/2006/ole">
             <mc:AlternateContent xmlns:mc="http://schemas.openxmlformats.org/markup-compatibility/2006">
               <mc:Choice xmlns:v="urn:schemas-microsoft-com:vml" Requires="v">
-                <p:oleObj spid="_x0000_s582701" name="Equation" r:id="rId5" imgW="1816100" imgH="482600" progId="Equation.DSMT4">
+                <p:oleObj spid="_x0000_s582704" name="Equation" r:id="rId5" imgW="1816100" imgH="482600" progId="Equation.DSMT4">
                   <p:embed/>
                 </p:oleObj>
               </mc:Choice>
@@ -13256,7 +13231,19 @@
             </a:r>
             <a:r>
               <a:rPr lang="en-US" sz="4800" dirty="0" smtClean="0"/>
-              <a:t> P </a:t>
+              <a:t> </a:t>
+            </a:r>
+            <a:r>
+              <a:rPr lang="en-US" sz="4800" dirty="0" smtClean="0">
+                <a:solidFill>
+                  <a:srgbClr val="0000FF"/>
+                </a:solidFill>
+              </a:rPr>
+              <a:t>P</a:t>
+            </a:r>
+            <a:r>
+              <a:rPr lang="en-US" sz="4800" dirty="0" smtClean="0"/>
+              <a:t> </a:t>
             </a:r>
             <a:r>
               <a:rPr lang="en-US" sz="4800" dirty="0"/>
@@ -13321,13 +13308,23 @@
               <a:t>57.8| </a:t>
             </a:r>
             <a:r>
+              <a:rPr lang="en-US" sz="4800" b="1" dirty="0" smtClean="0">
+                <a:solidFill>
+                  <a:srgbClr val="0000FF"/>
+                </a:solidFill>
+                <a:latin typeface="Euclid Symbol" charset="2"/>
+                <a:cs typeface="Euclid Symbol" charset="2"/>
+              </a:rPr>
+              <a:t>&gt;</a:t>
+            </a:r>
+            <a:r>
               <a:rPr lang="en-US" sz="4800" dirty="0" smtClean="0">
                 <a:solidFill>
                   <a:srgbClr val="0000FF"/>
                 </a:solidFill>
                 <a:latin typeface="cmsy10" charset="0"/>
               </a:rPr>
-              <a:t>&gt; </a:t>
+              <a:t> </a:t>
             </a:r>
             <a:r>
               <a:rPr lang="en-US" sz="4800" dirty="0">
@@ -13687,7 +13684,31 @@
                   <a:srgbClr val="0000CC"/>
                 </a:solidFill>
               </a:rPr>
-              <a:t>[Albert and </a:t>
+              <a:t>[</a:t>
+            </a:r>
+            <a:r>
+              <a:rPr lang="en-US" sz="3600" dirty="0">
+                <a:solidFill>
+                  <a:srgbClr val="660066"/>
+                </a:solidFill>
+              </a:rPr>
+              <a:t>Albert</a:t>
+            </a:r>
+            <a:r>
+              <a:rPr lang="en-US" sz="3600" dirty="0">
+                <a:solidFill>
+                  <a:srgbClr val="0000CC"/>
+                </a:solidFill>
+              </a:rPr>
+              <a:t> and </a:t>
+            </a:r>
+            <a:r>
+              <a:rPr lang="en-US" sz="3600" dirty="0" smtClean="0">
+                <a:solidFill>
+                  <a:srgbClr val="660066"/>
+                </a:solidFill>
+              </a:rPr>
+              <a:t>Drew</a:t>
             </a:r>
             <a:r>
               <a:rPr lang="en-US" sz="3600" dirty="0" smtClean="0">
@@ -13695,7 +13716,7 @@
                   <a:srgbClr val="0000CC"/>
                 </a:solidFill>
               </a:rPr>
-              <a:t>Drew </a:t>
+              <a:t> </a:t>
             </a:r>
             <a:r>
               <a:rPr lang="en-US" sz="3600" dirty="0">
@@ -13755,7 +13776,23 @@
                   <a:srgbClr val="0000CC"/>
                 </a:solidFill>
               </a:rPr>
-              <a:t>[David </a:t>
+              <a:t>[</a:t>
+            </a:r>
+            <a:r>
+              <a:rPr lang="en-US" sz="3600" dirty="0" smtClean="0">
+                <a:solidFill>
+                  <a:srgbClr val="008000"/>
+                </a:solidFill>
+              </a:rPr>
+              <a:t>David</a:t>
+            </a:r>
+            <a:r>
+              <a:rPr lang="en-US" sz="3600" dirty="0" smtClean="0">
+                <a:solidFill>
+                  <a:srgbClr val="0000CC"/>
+                </a:solidFill>
+              </a:rPr>
+              <a:t> </a:t>
             </a:r>
             <a:r>
               <a:rPr lang="en-US" sz="3600" dirty="0">
@@ -13768,10 +13805,18 @@
             <a:r>
               <a:rPr lang="en-US" sz="3600" dirty="0" smtClean="0">
                 <a:solidFill>
+                  <a:srgbClr val="008000"/>
+                </a:solidFill>
+              </a:rPr>
+              <a:t>Mike</a:t>
+            </a:r>
+            <a:r>
+              <a:rPr lang="en-US" sz="3600" dirty="0" smtClean="0">
+                <a:solidFill>
                   <a:srgbClr val="0000CC"/>
                 </a:solidFill>
               </a:rPr>
-              <a:t>Mike </a:t>
+              <a:t> </a:t>
             </a:r>
             <a:r>
               <a:rPr lang="en-US" sz="3600" dirty="0">
@@ -13834,7 +13879,7 @@
             <a:r>
               <a:rPr lang="en-US" sz="4400" baseline="-25000" dirty="0" err="1">
                 <a:solidFill>
-                  <a:srgbClr val="0000CC"/>
+                  <a:srgbClr val="660066"/>
                 </a:solidFill>
               </a:rPr>
               <a:t>A</a:t>
@@ -13842,7 +13887,7 @@
             <a:r>
               <a:rPr lang="en-US" sz="4400" baseline="-25000" dirty="0" err="1" smtClean="0">
                 <a:solidFill>
-                  <a:srgbClr val="0000CC"/>
+                  <a:srgbClr val="660066"/>
                 </a:solidFill>
               </a:rPr>
               <a:t>lbert,Drew</a:t>
@@ -13870,14 +13915,14 @@
             <a:r>
               <a:rPr lang="en-US" sz="4400" baseline="-25000" dirty="0" err="1" smtClean="0">
                 <a:solidFill>
-                  <a:srgbClr val="0000CC"/>
+                  <a:srgbClr val="008000"/>
                 </a:solidFill>
               </a:rPr>
               <a:t>David,Mike</a:t>
             </a:r>
             <a:endParaRPr lang="en-US" sz="4400" baseline="-25000" dirty="0" smtClean="0">
               <a:solidFill>
-                <a:srgbClr val="0000CC"/>
+                <a:srgbClr val="008000"/>
               </a:solidFill>
             </a:endParaRPr>
           </a:p>
@@ -13910,7 +13955,7 @@
                   <a:srgbClr val="660066"/>
                 </a:solidFill>
               </a:rPr>
-              <a:t>Obviously, </a:t>
+              <a:t>Obvious </a:t>
             </a:r>
             <a:r>
               <a:rPr lang="en-US" sz="3600" dirty="0" smtClean="0">
@@ -14419,7 +14464,31 @@
                   <a:srgbClr val="0000CC"/>
                 </a:solidFill>
               </a:rPr>
-              <a:t>[Albert and </a:t>
+              <a:t>[</a:t>
+            </a:r>
+            <a:r>
+              <a:rPr lang="en-US" sz="3600" dirty="0">
+                <a:solidFill>
+                  <a:srgbClr val="660066"/>
+                </a:solidFill>
+              </a:rPr>
+              <a:t>Albert</a:t>
+            </a:r>
+            <a:r>
+              <a:rPr lang="en-US" sz="3600" dirty="0">
+                <a:solidFill>
+                  <a:srgbClr val="0000CC"/>
+                </a:solidFill>
+              </a:rPr>
+              <a:t> and </a:t>
+            </a:r>
+            <a:r>
+              <a:rPr lang="en-US" sz="3600" dirty="0" smtClean="0">
+                <a:solidFill>
+                  <a:srgbClr val="660066"/>
+                </a:solidFill>
+              </a:rPr>
+              <a:t>Drew</a:t>
             </a:r>
             <a:r>
               <a:rPr lang="en-US" sz="3600" dirty="0" smtClean="0">
@@ -14427,7 +14496,7 @@
                   <a:srgbClr val="0000CC"/>
                 </a:solidFill>
               </a:rPr>
-              <a:t>Drew </a:t>
+              <a:t> </a:t>
             </a:r>
             <a:r>
               <a:rPr lang="en-US" sz="3600" dirty="0">
@@ -14487,7 +14556,31 @@
                   <a:srgbClr val="0000CC"/>
                 </a:solidFill>
               </a:rPr>
-              <a:t>[Albert and </a:t>
+              <a:t>[</a:t>
+            </a:r>
+            <a:r>
+              <a:rPr lang="en-US" sz="3600" dirty="0">
+                <a:solidFill>
+                  <a:srgbClr val="660066"/>
+                </a:solidFill>
+              </a:rPr>
+              <a:t>Albert</a:t>
+            </a:r>
+            <a:r>
+              <a:rPr lang="en-US" sz="3600" dirty="0">
+                <a:solidFill>
+                  <a:srgbClr val="0000CC"/>
+                </a:solidFill>
+              </a:rPr>
+              <a:t> and </a:t>
+            </a:r>
+            <a:r>
+              <a:rPr lang="en-US" sz="3600" dirty="0" smtClean="0">
+                <a:solidFill>
+                  <a:srgbClr val="008000"/>
+                </a:solidFill>
+              </a:rPr>
+              <a:t>Mike</a:t>
             </a:r>
             <a:r>
               <a:rPr lang="en-US" sz="3600" dirty="0" smtClean="0">
@@ -14495,7 +14588,7 @@
                   <a:srgbClr val="0000CC"/>
                 </a:solidFill>
               </a:rPr>
-              <a:t>Mike </a:t>
+              <a:t> </a:t>
             </a:r>
             <a:r>
               <a:rPr lang="en-US" sz="3600" dirty="0">
@@ -14558,10 +14651,54 @@
             <a:r>
               <a:rPr lang="en-US" sz="4400" baseline="-25000" dirty="0" err="1">
                 <a:solidFill>
+                  <a:srgbClr val="660066"/>
+                </a:solidFill>
+              </a:rPr>
+              <a:t>A</a:t>
+            </a:r>
+            <a:r>
+              <a:rPr lang="en-US" sz="4400" baseline="-25000" dirty="0" err="1" smtClean="0">
+                <a:solidFill>
+                  <a:srgbClr val="660066"/>
+                </a:solidFill>
+              </a:rPr>
+              <a:t>lbert,Drew</a:t>
+            </a:r>
+            <a:r>
+              <a:rPr lang="en-US" sz="4400" baseline="-25000" dirty="0" smtClean="0"/>
+              <a:t> </a:t>
+            </a:r>
+            <a:r>
+              <a:rPr lang="en-US" sz="4400" dirty="0"/>
+              <a:t>&amp;</a:t>
+            </a:r>
+            <a:r>
+              <a:rPr lang="en-US" sz="4400" dirty="0" smtClean="0"/>
+              <a:t> </a:t>
+            </a:r>
+            <a:r>
+              <a:rPr lang="en-US" sz="4400" dirty="0" err="1" smtClean="0">
+                <a:solidFill>
                   <a:srgbClr val="0000CC"/>
                 </a:solidFill>
               </a:rPr>
+              <a:t>M</a:t>
+            </a:r>
+            <a:r>
+              <a:rPr lang="en-US" sz="4400" baseline="-25000" dirty="0" err="1">
+                <a:solidFill>
+                  <a:srgbClr val="660066"/>
+                </a:solidFill>
+              </a:rPr>
               <a:t>A</a:t>
+            </a:r>
+            <a:r>
+              <a:rPr lang="en-US" sz="4400" baseline="-25000" dirty="0" err="1" smtClean="0">
+                <a:solidFill>
+                  <a:srgbClr val="660066"/>
+                </a:solidFill>
+              </a:rPr>
+              <a:t>lbert</a:t>
             </a:r>
             <a:r>
               <a:rPr lang="en-US" sz="4400" baseline="-25000" dirty="0" err="1" smtClean="0">
@@ -14569,47 +14706,19 @@
                   <a:srgbClr val="0000CC"/>
                 </a:solidFill>
               </a:rPr>
-              <a:t>lbert,Drew</a:t>
-            </a:r>
-            <a:r>
-              <a:rPr lang="en-US" sz="4400" baseline="-25000" dirty="0" smtClean="0"/>
-              <a:t> </a:t>
-            </a:r>
-            <a:r>
-              <a:rPr lang="en-US" sz="4400" dirty="0"/>
-              <a:t>&amp;</a:t>
-            </a:r>
-            <a:r>
-              <a:rPr lang="en-US" sz="4400" dirty="0" smtClean="0"/>
-              <a:t> </a:t>
-            </a:r>
-            <a:r>
-              <a:rPr lang="en-US" sz="4400" dirty="0" err="1" smtClean="0">
-                <a:solidFill>
-                  <a:srgbClr val="0000CC"/>
-                </a:solidFill>
-              </a:rPr>
-              <a:t>M</a:t>
-            </a:r>
-            <a:r>
-              <a:rPr lang="en-US" sz="4400" baseline="-25000" dirty="0" err="1">
-                <a:solidFill>
-                  <a:srgbClr val="0000CC"/>
-                </a:solidFill>
-              </a:rPr>
-              <a:t>A</a:t>
+              <a:t>,</a:t>
             </a:r>
             <a:r>
               <a:rPr lang="en-US" sz="4400" baseline="-25000" dirty="0" err="1" smtClean="0">
                 <a:solidFill>
-                  <a:srgbClr val="0000CC"/>
+                  <a:srgbClr val="008000"/>
                 </a:solidFill>
               </a:rPr>
-              <a:t>lbert,Mike</a:t>
+              <a:t>Mike</a:t>
             </a:r>
             <a:endParaRPr lang="en-US" sz="4400" baseline="-25000" dirty="0" smtClean="0">
               <a:solidFill>
-                <a:srgbClr val="0000CC"/>
+                <a:srgbClr val="008000"/>
               </a:solidFill>
             </a:endParaRPr>
           </a:p>
@@ -14697,10 +14806,26 @@
             <a:r>
               <a:rPr lang="en-US" sz="4400" baseline="-25000" dirty="0" err="1" smtClean="0">
                 <a:solidFill>
+                  <a:srgbClr val="660066"/>
+                </a:solidFill>
+              </a:rPr>
+              <a:t>Drew</a:t>
+            </a:r>
+            <a:r>
+              <a:rPr lang="en-US" sz="4400" baseline="-25000" dirty="0" err="1" smtClean="0">
+                <a:solidFill>
                   <a:srgbClr val="0000CC"/>
                 </a:solidFill>
               </a:rPr>
-              <a:t>Drew,Mike</a:t>
+              <a:t>,</a:t>
+            </a:r>
+            <a:r>
+              <a:rPr lang="en-US" sz="4400" baseline="-25000" dirty="0" err="1" smtClean="0">
+                <a:solidFill>
+                  <a:srgbClr val="008000"/>
+                </a:solidFill>
+              </a:rPr>
+              <a:t>Mike</a:t>
             </a:r>
             <a:r>
               <a:rPr lang="en-US" sz="4000" baseline="-25000" dirty="0" smtClean="0"/>
@@ -15094,7 +15219,7 @@
         <p:spPr>
           <a:xfrm>
             <a:off x="355600" y="1765300"/>
-            <a:ext cx="8255000" cy="1054100"/>
+            <a:ext cx="8641862" cy="1038469"/>
           </a:xfrm>
         </p:spPr>
         <p:txBody>
@@ -15118,7 +15243,23 @@
             </a:r>
             <a:r>
               <a:rPr lang="en-US" sz="4400" dirty="0"/>
-              <a:t> linearity of </a:t>
+              <a:t> </a:t>
+            </a:r>
+            <a:r>
+              <a:rPr lang="en-US" sz="4400" dirty="0" err="1" smtClean="0"/>
+              <a:t>additiv</a:t>
+            </a:r>
+            <a:r>
+              <a:rPr lang="en-US" sz="4400" dirty="0" err="1" smtClean="0"/>
+              <a:t>ity</a:t>
+            </a:r>
+            <a:r>
+              <a:rPr lang="en-US" sz="4400" dirty="0" smtClean="0"/>
+              <a:t> </a:t>
+            </a:r>
+            <a:r>
+              <a:rPr lang="en-US" sz="4400" dirty="0"/>
+              <a:t>of </a:t>
             </a:r>
             <a:r>
               <a:rPr lang="en-US" sz="4400" dirty="0" err="1"/>
@@ -15303,7 +15444,7 @@
           <a:graphicData uri="http://schemas.openxmlformats.org/presentationml/2006/ole">
             <mc:AlternateContent xmlns:mc="http://schemas.openxmlformats.org/markup-compatibility/2006">
               <mc:Choice xmlns:v="urn:schemas-microsoft-com:vml" Requires="v">
-                <p:oleObj spid="_x0000_s585814" name="Equation" r:id="rId5" imgW="2273300" imgH="482600" progId="Equation.DSMT4">
+                <p:oleObj spid="_x0000_s585821" name="Equation" r:id="rId5" imgW="2273300" imgH="482600" progId="Equation.DSMT4">
                   <p:embed/>
                 </p:oleObj>
               </mc:Choice>
@@ -15360,7 +15501,7 @@
           <a:graphicData uri="http://schemas.openxmlformats.org/presentationml/2006/ole">
             <mc:AlternateContent xmlns:mc="http://schemas.openxmlformats.org/markup-compatibility/2006">
               <mc:Choice xmlns:v="urn:schemas-microsoft-com:vml" Requires="v">
-                <p:oleObj spid="_x0000_s585815" name="Equation" r:id="rId7" imgW="571500" imgH="241300" progId="Equation.DSMT4">
+                <p:oleObj spid="_x0000_s585822" name="Equation" r:id="rId7" imgW="571500" imgH="241300" progId="Equation.DSMT4">
                   <p:embed/>
                 </p:oleObj>
               </mc:Choice>
@@ -15442,7 +15583,7 @@
           <a:graphicData uri="http://schemas.openxmlformats.org/presentationml/2006/ole">
             <mc:AlternateContent xmlns:mc="http://schemas.openxmlformats.org/markup-compatibility/2006">
               <mc:Choice xmlns:v="urn:schemas-microsoft-com:vml" Requires="v">
-                <p:oleObj spid="_x0000_s585816" name="Equation" r:id="rId9" imgW="2476500" imgH="482600" progId="Equation.DSMT4">
+                <p:oleObj spid="_x0000_s585823" name="Equation" r:id="rId9" imgW="2476500" imgH="482600" progId="Equation.DSMT4">
                   <p:embed/>
                 </p:oleObj>
               </mc:Choice>
@@ -15604,7 +15745,7 @@
                                     </p:set>
                                     <p:animEffect transition="in" filter="wipe(left)">
                                       <p:cBhvr>
-                                        <p:cTn id="12" dur="500"/>
+                                        <p:cTn id="12" dur="1000"/>
                                         <p:tgtEl>
                                           <p:spTgt spid="3"/>
                                         </p:tgtEl>
@@ -15657,7 +15798,7 @@
                                     </p:set>
                                     <p:animEffect transition="in" filter="wipe(left)">
                                       <p:cBhvr>
-                                        <p:cTn id="17" dur="500"/>
+                                        <p:cTn id="17" dur="1000"/>
                                         <p:tgtEl>
                                           <p:spTgt spid="2"/>
                                         </p:tgtEl>
@@ -15710,7 +15851,7 @@
                                     </p:set>
                                     <p:animEffect transition="in" filter="wipe(up)">
                                       <p:cBhvr>
-                                        <p:cTn id="22" dur="500"/>
+                                        <p:cTn id="22" dur="1000"/>
                                         <p:tgtEl>
                                           <p:spTgt spid="7"/>
                                         </p:tgtEl>

</xml_diff>